<commit_message>
Changes in naming of csv files
</commit_message>
<xml_diff>
--- a/Presentation_Stelmaszek_11942491_Ferrand_11942895_Logi_11942485.pptx
+++ b/Presentation_Stelmaszek_11942491_Ferrand_11942895_Logi_11942485.pptx
@@ -30,14 +30,14 @@
   <p:notesSz cx="6858000" cy="9144000"/>
   <p:embeddedFontLst>
     <p:embeddedFont>
-      <p:font typeface="Lato" panose="020B0604020202020204" charset="0"/>
+      <p:font typeface="Raleway" panose="020B0604020202020204" charset="-18"/>
       <p:regular r:id="rId20"/>
       <p:bold r:id="rId21"/>
       <p:italic r:id="rId22"/>
       <p:boldItalic r:id="rId23"/>
     </p:embeddedFont>
     <p:embeddedFont>
-      <p:font typeface="Raleway" panose="020B0604020202020204" charset="-18"/>
+      <p:font typeface="Lato" panose="020B0604020202020204" charset="0"/>
       <p:regular r:id="rId24"/>
       <p:bold r:id="rId25"/>
       <p:italic r:id="rId26"/>
@@ -275,7 +275,7 @@
   </p:defaultTextStyle>
   <p:extLst>
     <p:ext uri="{EFAFB233-063F-42B5-8137-9DF3F51BA10A}">
-      <p15:sldGuideLst xmlns:p15="http://schemas.microsoft.com/office/powerpoint/2012/main" xmlns:p14="http://schemas.microsoft.com/office/powerpoint/2010/main" xmlns:com="http://schemas.openxmlformats.org/drawingml/2006/compatibility" xmlns:pvml="urn:schemas-microsoft-com:office:powerpoint" xmlns:v="urn:schemas-microsoft-com:vml" xmlns:o="urn:schemas-microsoft-com:office:office" xmlns:dgm="http://schemas.openxmlformats.org/drawingml/2006/diagram" xmlns:c="http://schemas.openxmlformats.org/drawingml/2006/chart" xmlns:mv="urn:schemas-microsoft-com:mac:vml" xmlns:mc="http://schemas.openxmlformats.org/markup-compatibility/2006" xmlns="">
+      <p15:sldGuideLst xmlns="" xmlns:mc="http://schemas.openxmlformats.org/markup-compatibility/2006" xmlns:mv="urn:schemas-microsoft-com:mac:vml" xmlns:c="http://schemas.openxmlformats.org/drawingml/2006/chart" xmlns:dgm="http://schemas.openxmlformats.org/drawingml/2006/diagram" xmlns:o="urn:schemas-microsoft-com:office:office" xmlns:v="urn:schemas-microsoft-com:vml" xmlns:pvml="urn:schemas-microsoft-com:office:powerpoint" xmlns:com="http://schemas.openxmlformats.org/drawingml/2006/compatibility" xmlns:p14="http://schemas.microsoft.com/office/powerpoint/2010/main" xmlns:p15="http://schemas.microsoft.com/office/powerpoint/2012/main">
         <p15:guide id="1" orient="horz" pos="1620">
           <p15:clr>
             <a:srgbClr val="A4A3A4"/>
@@ -1807,7 +1807,7 @@
         </p:nvSpPr>
         <p:spPr>
           <a:xfrm>
-            <a:off x="381300" y="685800"/>
+            <a:off x="381000" y="685800"/>
             <a:ext cx="6096000" cy="3429000"/>
           </a:xfrm>
           <a:custGeom>
@@ -11455,26 +11455,26 @@
               <a:buChar char="●"/>
             </a:pPr>
             <a:r>
-              <a:rPr lang="pl"/>
+              <a:rPr lang="pl" dirty="0"/>
               <a:t>Web scraper - Selenium (</a:t>
             </a:r>
             <a:r>
-              <a:rPr lang="pl" i="1"/>
+              <a:rPr lang="pl" i="1" dirty="0"/>
               <a:t>wait</a:t>
             </a:r>
             <a:r>
-              <a:rPr lang="pl"/>
+              <a:rPr lang="pl" dirty="0"/>
               <a:t> and </a:t>
             </a:r>
             <a:r>
-              <a:rPr lang="pl" i="1"/>
+              <a:rPr lang="pl" i="1" dirty="0"/>
               <a:t>download_sites </a:t>
             </a:r>
             <a:r>
-              <a:rPr lang="pl"/>
+              <a:rPr lang="pl" dirty="0"/>
               <a:t>functions) - no API!</a:t>
             </a:r>
-            <a:endParaRPr/>
+            <a:endParaRPr dirty="0"/>
           </a:p>
           <a:p>
             <a:pPr marL="457200" lvl="0" indent="-311150" algn="l" rtl="0">
@@ -11488,10 +11488,10 @@
               <a:buChar char="●"/>
             </a:pPr>
             <a:r>
-              <a:rPr lang="pl"/>
+              <a:rPr lang="pl" dirty="0"/>
               <a:t>A couple of articles omitted (very untypical structure)</a:t>
             </a:r>
-            <a:endParaRPr/>
+            <a:endParaRPr dirty="0"/>
           </a:p>
           <a:p>
             <a:pPr marL="457200" lvl="0" indent="-311150" algn="l" rtl="0">
@@ -11505,10 +11505,18 @@
               <a:buChar char="●"/>
             </a:pPr>
             <a:r>
-              <a:rPr lang="pl"/>
-              <a:t>Number of press releases: 3624 (all_pressreleases.csv)</a:t>
+              <a:rPr lang="pl" dirty="0"/>
+              <a:t>Number of press releases: 3624 </a:t>
             </a:r>
-            <a:endParaRPr/>
+            <a:r>
+              <a:rPr lang="pl" dirty="0" smtClean="0"/>
+              <a:t>(pressreleases_all.csv</a:t>
+            </a:r>
+            <a:r>
+              <a:rPr lang="pl" dirty="0"/>
+              <a:t>)</a:t>
+            </a:r>
+            <a:endParaRPr dirty="0"/>
           </a:p>
           <a:p>
             <a:pPr marL="457200" lvl="0" indent="-311150" algn="l" rtl="0">
@@ -11522,10 +11530,22 @@
               <a:buChar char="●"/>
             </a:pPr>
             <a:r>
+              <a:rPr lang="pl" dirty="0"/>
+              <a:t>Number of speeches: </a:t>
+            </a:r>
+            <a:r>
               <a:rPr lang="pl"/>
-              <a:t>Number of speeches: 809 (all_speaches.csv)</a:t>
+              <a:t>809 </a:t>
             </a:r>
-            <a:endParaRPr/>
+            <a:r>
+              <a:rPr lang="pl" smtClean="0"/>
+              <a:t>(speeches_all.csv</a:t>
+            </a:r>
+            <a:r>
+              <a:rPr lang="pl" dirty="0"/>
+              <a:t>)</a:t>
+            </a:r>
+            <a:endParaRPr dirty="0"/>
           </a:p>
           <a:p>
             <a:pPr marL="457200" lvl="0" indent="-311150" algn="l" rtl="0">
@@ -11539,10 +11559,10 @@
               <a:buChar char="●"/>
             </a:pPr>
             <a:r>
-              <a:rPr lang="pl"/>
+              <a:rPr lang="pl" dirty="0"/>
               <a:t>Changes in yields of treasury bonds and NASDAQ index saved in indexes2.csv</a:t>
             </a:r>
-            <a:endParaRPr/>
+            <a:endParaRPr dirty="0"/>
           </a:p>
         </p:txBody>
       </p:sp>

</xml_diff>